<commit_message>
Descreva o que mudou, ex: Ajusta geração de slides
</commit_message>
<xml_diff>
--- a/template.pptx
+++ b/template.pptx
@@ -246,7 +246,7 @@
           <a:p>
             <a:fld id="{93BB57F4-6D8F-415E-AF91-44F3E8E62517}" type="datetimeFigureOut">
               <a:rPr lang="pt-BR" smtClean="0"/>
-              <a:t>16/05/2025</a:t>
+              <a:t>19/05/2025</a:t>
             </a:fld>
             <a:endParaRPr lang="pt-BR"/>
           </a:p>
@@ -429,7 +429,7 @@
             <a:fld id="{EFC10EE1-B198-C942-8235-326C972CBB30}" type="datetimeFigureOut">
               <a:rPr lang="en-US" smtClean="0"/>
               <a:pPr/>
-              <a:t>5/16/2025</a:t>
+              <a:t>5/19/2025</a:t>
             </a:fld>
             <a:endParaRPr lang="en-US"/>
           </a:p>
@@ -1694,7 +1694,7 @@
           <a:lstStyle/>
           <a:p>
             <a:pPr algn="ctr"/>
-            <a:endParaRPr lang="pt-BR"/>
+            <a:endParaRPr lang="pt-BR" dirty="0"/>
           </a:p>
         </p:txBody>
       </p:sp>
@@ -1895,7 +1895,7 @@
         <p:spPr>
           <a:xfrm>
             <a:off x="1" y="895483"/>
-            <a:ext cx="7581232" cy="1015663"/>
+            <a:ext cx="7581232" cy="553998"/>
           </a:xfrm>
           <a:prstGeom prst="rect">
             <a:avLst/>
@@ -1926,21 +1926,10 @@
           </a:lstStyle>
           <a:p>
             <a:r>
-              <a:rPr lang="pt-BR" b="1"/>
-              <a:t>Hero </a:t>
-            </a:r>
-            <a:r>
-              <a:rPr lang="pt-BR" b="1" err="1"/>
-              <a:t>MotoCorp</a:t>
-            </a:r>
-            <a:r>
-              <a:rPr lang="pt-BR" b="1"/>
-              <a:t> </a:t>
-            </a:r>
-            <a:r>
-              <a:rPr lang="pt-BR"/>
-              <a:t>planeja instalar fábrica na Zona Franca de Manaus</a:t>
-            </a:r>
+              <a:rPr lang="pt-BR" b="1" dirty="0"/>
+              <a:t>{titulo}</a:t>
+            </a:r>
+            <a:endParaRPr lang="pt-BR" dirty="0"/>
           </a:p>
         </p:txBody>
       </p:sp>
@@ -1974,7 +1963,7 @@
           <a:p>
             <a:pPr algn="just"/>
             <a:r>
-              <a:rPr lang="en-US" sz="2000">
+              <a:rPr lang="en-US" sz="2000" dirty="0">
                 <a:solidFill>
                   <a:schemeClr val="tx2">
                     <a:lumMod val="65000"/>
@@ -1985,7 +1974,7 @@
                 <a:ea typeface="Roboto" panose="02000000000000000000" pitchFamily="2" charset="0"/>
                 <a:cs typeface="Poppins" panose="00000500000000000000" pitchFamily="2" charset="0"/>
               </a:rPr>
-              <a:t>06/05/2025</a:t>
+              <a:t>{data}</a:t>
             </a:r>
           </a:p>
         </p:txBody>
@@ -2005,7 +1994,7 @@
         <p:spPr>
           <a:xfrm>
             <a:off x="-19259" y="5900932"/>
-            <a:ext cx="7776900" cy="584775"/>
+            <a:ext cx="7776900" cy="338554"/>
           </a:xfrm>
           <a:prstGeom prst="rect">
             <a:avLst/>
@@ -2019,7 +2008,7 @@
           <a:lstStyle/>
           <a:p>
             <a:r>
-              <a:rPr lang="en-US" sz="1600">
+              <a:rPr lang="en-US" sz="1600" dirty="0">
                 <a:solidFill>
                   <a:schemeClr val="tx2">
                     <a:lumMod val="65000"/>
@@ -2030,39 +2019,9 @@
                 <a:ea typeface="Roboto" panose="02000000000000000000" pitchFamily="2" charset="0"/>
                 <a:cs typeface="Poppins" panose="00000500000000000000" pitchFamily="2" charset="0"/>
               </a:rPr>
-              <a:t>Fonte:</a:t>
-            </a:r>
-            <a:r>
-              <a:rPr lang="en-US" sz="1600">
-                <a:solidFill>
-                  <a:srgbClr val="FF0000"/>
-                </a:solidFill>
-                <a:latin typeface="Poppins" panose="00000500000000000000" pitchFamily="2" charset="0"/>
-                <a:ea typeface="Roboto" panose="02000000000000000000" pitchFamily="2" charset="0"/>
-                <a:cs typeface="Poppins" panose="00000500000000000000" pitchFamily="2" charset="0"/>
-                <a:hlinkClick r:id="rId3">
-                  <a:extLst>
-                    <a:ext uri="{A12FA001-AC4F-418D-AE19-62706E023703}">
-                      <ahyp:hlinkClr xmlns:ahyp="http://schemas.microsoft.com/office/drawing/2018/hyperlinkcolor" val="tx"/>
-                    </a:ext>
-                  </a:extLst>
-                </a:hlinkClick>
-              </a:rPr>
-              <a:t> </a:t>
-            </a:r>
-            <a:r>
-              <a:rPr lang="en-US" sz="1600">
-                <a:solidFill>
-                  <a:srgbClr val="FF0000"/>
-                </a:solidFill>
-                <a:latin typeface="Poppins" panose="00000500000000000000" pitchFamily="2" charset="0"/>
-                <a:ea typeface="Roboto" panose="02000000000000000000" pitchFamily="2" charset="0"/>
-                <a:cs typeface="Poppins" panose="00000500000000000000" pitchFamily="2" charset="0"/>
-                <a:hlinkClick r:id="rId4"/>
-              </a:rPr>
-              <a:t>https://www.acritica.com/economia/hero-motocorp-planeja-instalar-fabrica-na-zona-franca-de-manaus-1.371629</a:t>
-            </a:r>
-            <a:endParaRPr lang="en-US" sz="1600">
+              <a:t>link</a:t>
+            </a:r>
+            <a:endParaRPr lang="en-US" sz="1600" dirty="0">
               <a:solidFill>
                 <a:srgbClr val="FF0000"/>
               </a:solidFill>
@@ -2239,7 +2198,7 @@
                 <a:latin typeface="Poppins" panose="00000500000000000000" pitchFamily="2" charset="0"/>
                 <a:ea typeface="Roboto" panose="02000000000000000000" pitchFamily="2" charset="0"/>
                 <a:cs typeface="Poppins" panose="00000500000000000000" pitchFamily="2" charset="0"/>
-                <a:hlinkClick r:id="rId5"/>
+                <a:hlinkClick r:id="rId3"/>
               </a:rPr>
               <a:t>https://bncamazonas.com.br/poder/corredor-brasil-chile-beneficia-zfm-e-dobra-comercio-diz-ministra/</a:t>
             </a:r>
@@ -2580,7 +2539,7 @@
             </a:r>
             <a:r>
               <a:rPr lang="en-US" sz="1600">
-                <a:hlinkClick r:id="rId6"/>
+                <a:hlinkClick r:id="rId4"/>
               </a:rPr>
               <a:t>https://www.cnnbrasil.com.br/nacional/norte/am/rio-negro-ultrapassa-cota-de-inundacao-em-manaus-no-amazonas/</a:t>
             </a:r>
@@ -2609,7 +2568,7 @@
         <p:spPr bwMode="auto">
           <a:xfrm>
             <a:off x="-10170" y="2951993"/>
-            <a:ext cx="7668007" cy="3091359"/>
+            <a:ext cx="7668007" cy="1060034"/>
           </a:xfrm>
           <a:prstGeom prst="rect">
             <a:avLst/>
@@ -2628,7 +2587,7 @@
               </a:lnSpc>
             </a:pPr>
             <a:r>
-              <a:rPr lang="pt-BR" sz="2200">
+              <a:rPr lang="pt-BR" sz="2200" dirty="0">
                 <a:solidFill>
                   <a:schemeClr val="tx2">
                     <a:lumMod val="65000"/>
@@ -2639,35 +2598,7 @@
                 <a:ea typeface="Roboto" panose="02000000000000000000" pitchFamily="2" charset="0"/>
                 <a:cs typeface="Poppins" panose="00000500000000000000" pitchFamily="2" charset="0"/>
               </a:rPr>
-              <a:t>Reconhecida como a maior fabricante de motocicletas do mundo em volume, a Hero </a:t>
-            </a:r>
-            <a:r>
-              <a:rPr lang="pt-BR" sz="2200" err="1">
-                <a:solidFill>
-                  <a:schemeClr val="tx2">
-                    <a:lumMod val="65000"/>
-                    <a:lumOff val="35000"/>
-                  </a:schemeClr>
-                </a:solidFill>
-                <a:latin typeface="Poppins" panose="00000500000000000000" pitchFamily="2" charset="0"/>
-                <a:ea typeface="Roboto" panose="02000000000000000000" pitchFamily="2" charset="0"/>
-                <a:cs typeface="Poppins" panose="00000500000000000000" pitchFamily="2" charset="0"/>
-              </a:rPr>
-              <a:t>MotoCorp</a:t>
-            </a:r>
-            <a:r>
-              <a:rPr lang="pt-BR" sz="2200">
-                <a:solidFill>
-                  <a:schemeClr val="tx2">
-                    <a:lumMod val="65000"/>
-                    <a:lumOff val="35000"/>
-                  </a:schemeClr>
-                </a:solidFill>
-                <a:latin typeface="Poppins" panose="00000500000000000000" pitchFamily="2" charset="0"/>
-                <a:ea typeface="Roboto" panose="02000000000000000000" pitchFamily="2" charset="0"/>
-                <a:cs typeface="Poppins" panose="00000500000000000000" pitchFamily="2" charset="0"/>
-              </a:rPr>
-              <a:t> é líder absoluta no segmento na Índia e busca agora expandir sua presença na América Latina por meio do mercado brasileiro.</a:t>
+              <a:t>{resumo}</a:t>
             </a:r>
           </a:p>
           <a:p>
@@ -2676,7 +2607,7 @@
                 <a:spcPct val="150000"/>
               </a:lnSpc>
             </a:pPr>
-            <a:endParaRPr lang="pt-BR" sz="2200">
+            <a:endParaRPr lang="pt-BR" sz="2200" dirty="0">
               <a:solidFill>
                 <a:schemeClr val="tx2">
                   <a:lumMod val="65000"/>
@@ -3024,7 +2955,7 @@
                 <a:latin typeface="Poppins" panose="00000500000000000000" pitchFamily="2" charset="0"/>
                 <a:ea typeface="Roboto" panose="02000000000000000000" pitchFamily="2" charset="0"/>
                 <a:cs typeface="Poppins" panose="00000500000000000000" pitchFamily="2" charset="0"/>
-                <a:hlinkClick r:id="rId7"/>
+                <a:hlinkClick r:id="rId5"/>
               </a:rPr>
               <a:t> https://g1.globo.com/economia/noticia/2025/05/07/dolar-ibovespa.ghtml</a:t>
             </a:r>
@@ -3054,7 +2985,7 @@
         <p:spPr>
           <a:xfrm>
             <a:off x="8078038" y="895483"/>
-            <a:ext cx="7581232" cy="1477328"/>
+            <a:ext cx="7581232" cy="553998"/>
           </a:xfrm>
           <a:prstGeom prst="rect">
             <a:avLst/>
@@ -3085,24 +3016,8 @@
           </a:lstStyle>
           <a:p>
             <a:r>
-              <a:rPr lang="pt-BR"/>
-              <a:t>ERT </a:t>
-            </a:r>
-            <a:r>
-              <a:rPr lang="pt-BR" b="1"/>
-              <a:t>Bioplásticos</a:t>
-            </a:r>
-            <a:r>
-              <a:rPr lang="pt-BR"/>
-              <a:t> inaugura </a:t>
-            </a:r>
-            <a:r>
-              <a:rPr lang="pt-BR" b="1"/>
-              <a:t>nova fábrica </a:t>
-            </a:r>
-            <a:r>
-              <a:rPr lang="pt-BR"/>
-              <a:t>em Manaus e impulsiona produção sustentável na Amazônia</a:t>
+              <a:rPr lang="pt-BR" dirty="0"/>
+              <a:t>titulo</a:t>
             </a:r>
           </a:p>
         </p:txBody>
@@ -3124,7 +3039,7 @@
         <p:spPr bwMode="auto">
           <a:xfrm>
             <a:off x="7890969" y="2951993"/>
-            <a:ext cx="8103782" cy="1567865"/>
+            <a:ext cx="8103782" cy="552202"/>
           </a:xfrm>
           <a:prstGeom prst="rect">
             <a:avLst/>
@@ -3143,7 +3058,7 @@
               </a:lnSpc>
             </a:pPr>
             <a:r>
-              <a:rPr lang="pt-BR" sz="2200">
+              <a:rPr lang="pt-BR" sz="2200" dirty="0">
                 <a:solidFill>
                   <a:schemeClr val="tx2">
                     <a:lumMod val="65000"/>
@@ -3154,9 +3069,9 @@
                 <a:ea typeface="Roboto" panose="02000000000000000000" pitchFamily="2" charset="0"/>
                 <a:cs typeface="Poppins" panose="00000500000000000000" pitchFamily="2" charset="0"/>
               </a:rPr>
-              <a:t>A fábrica entra em operação com contratos em vigor, entre eles o fornecimento de materiais para a Positivo Tecnologia.</a:t>
-            </a:r>
-            <a:endParaRPr lang="pt-BR" altLang="pt-BR" sz="2200">
+              <a:t>resumo</a:t>
+            </a:r>
+            <a:endParaRPr lang="pt-BR" altLang="pt-BR" sz="2200" dirty="0">
               <a:solidFill>
                 <a:schemeClr val="tx2">
                   <a:lumMod val="65000"/>
@@ -3200,7 +3115,7 @@
           <a:p>
             <a:pPr algn="just"/>
             <a:r>
-              <a:rPr lang="en-US" sz="2000">
+              <a:rPr lang="en-US" sz="2000" dirty="0" err="1">
                 <a:solidFill>
                   <a:schemeClr val="tx2">
                     <a:lumMod val="65000"/>
@@ -3211,8 +3126,19 @@
                 <a:ea typeface="Roboto" panose="02000000000000000000" pitchFamily="2" charset="0"/>
                 <a:cs typeface="Poppins" panose="00000500000000000000" pitchFamily="2" charset="0"/>
               </a:rPr>
-              <a:t>05/05/2025</a:t>
-            </a:r>
+              <a:t>dara</a:t>
+            </a:r>
+            <a:endParaRPr lang="en-US" sz="2000" dirty="0">
+              <a:solidFill>
+                <a:schemeClr val="tx2">
+                  <a:lumMod val="65000"/>
+                  <a:lumOff val="35000"/>
+                </a:schemeClr>
+              </a:solidFill>
+              <a:latin typeface="Poppins" panose="00000500000000000000" pitchFamily="2" charset="0"/>
+              <a:ea typeface="Roboto" panose="02000000000000000000" pitchFamily="2" charset="0"/>
+              <a:cs typeface="Poppins" panose="00000500000000000000" pitchFamily="2" charset="0"/>
+            </a:endParaRPr>
           </a:p>
         </p:txBody>
       </p:sp>
@@ -3245,57 +3171,16 @@
           <a:lstStyle/>
           <a:p>
             <a:r>
-              <a:rPr lang="en-US" sz="1600">
+              <a:rPr lang="en-US" sz="1600" dirty="0">
                 <a:solidFill>
-                  <a:schemeClr val="tx2">
-                    <a:lumMod val="65000"/>
-                    <a:lumOff val="35000"/>
-                  </a:schemeClr>
+                  <a:srgbClr val="FF0000"/>
                 </a:solidFill>
                 <a:latin typeface="Poppins" panose="00000500000000000000" pitchFamily="2" charset="0"/>
                 <a:ea typeface="Roboto" panose="02000000000000000000" pitchFamily="2" charset="0"/>
                 <a:cs typeface="Poppins" panose="00000500000000000000" pitchFamily="2" charset="0"/>
               </a:rPr>
-              <a:t>Fonte:</a:t>
-            </a:r>
-            <a:r>
-              <a:rPr lang="en-US" sz="1600">
-                <a:solidFill>
-                  <a:schemeClr val="tx2">
-                    <a:lumMod val="65000"/>
-                    <a:lumOff val="35000"/>
-                  </a:schemeClr>
-                </a:solidFill>
-                <a:latin typeface="Poppins" panose="00000500000000000000" pitchFamily="2" charset="0"/>
-                <a:ea typeface="Roboto" panose="02000000000000000000" pitchFamily="2" charset="0"/>
-                <a:cs typeface="Poppins" panose="00000500000000000000" pitchFamily="2" charset="0"/>
-                <a:hlinkClick r:id="rId8"/>
-              </a:rPr>
-              <a:t> </a:t>
-            </a:r>
-            <a:r>
-              <a:rPr lang="en-US" sz="1600">
-                <a:solidFill>
-                  <a:schemeClr val="tx2">
-                    <a:lumMod val="65000"/>
-                    <a:lumOff val="35000"/>
-                  </a:schemeClr>
-                </a:solidFill>
-                <a:latin typeface="Poppins" panose="00000500000000000000" pitchFamily="2" charset="0"/>
-                <a:ea typeface="Roboto" panose="02000000000000000000" pitchFamily="2" charset="0"/>
-                <a:cs typeface="Poppins" panose="00000500000000000000" pitchFamily="2" charset="0"/>
-                <a:hlinkClick r:id="rId9"/>
-              </a:rPr>
-              <a:t>https://msktv.com.br/ert-bioplasticos-inaugura-fabrica-manaus/</a:t>
-            </a:r>
-            <a:endParaRPr lang="en-US" sz="1600">
-              <a:solidFill>
-                <a:srgbClr val="FF0000"/>
-              </a:solidFill>
-              <a:latin typeface="Poppins" panose="00000500000000000000" pitchFamily="2" charset="0"/>
-              <a:ea typeface="Roboto" panose="02000000000000000000" pitchFamily="2" charset="0"/>
-              <a:cs typeface="Poppins" panose="00000500000000000000" pitchFamily="2" charset="0"/>
-            </a:endParaRPr>
+              <a:t>link</a:t>
+            </a:r>
           </a:p>
         </p:txBody>
       </p:sp>
@@ -3537,7 +3422,7 @@
             </a:r>
             <a:r>
               <a:rPr lang="en-US" sz="1600">
-                <a:hlinkClick r:id="rId4"/>
+                <a:hlinkClick r:id="rId6"/>
               </a:rPr>
               <a:t> https://www.acritica.com/economia/hero-motocorp-planeja-instalar-fabrica-na-zona-franca-de-manaus-1.371629</a:t>
             </a:r>
@@ -3678,59 +3563,6 @@
               <a:rPr lang="en-US"/>
               <a:t>06/05/2025</a:t>
             </a:r>
-          </a:p>
-        </p:txBody>
-      </p:sp>
-      <p:sp>
-        <p:nvSpPr>
-          <p:cNvPr id="6" name="TextBox 19">
-            <a:extLst>
-              <a:ext uri="{FF2B5EF4-FFF2-40B4-BE49-F238E27FC236}">
-                <a16:creationId xmlns:a16="http://schemas.microsoft.com/office/drawing/2014/main" id="{0769DB44-209C-BF3C-C1B7-6993CE42A591}"/>
-              </a:ext>
-            </a:extLst>
-          </p:cNvPr>
-          <p:cNvSpPr txBox="1"/>
-          <p:nvPr/>
-        </p:nvSpPr>
-        <p:spPr>
-          <a:xfrm>
-            <a:off x="6879852" y="1351185"/>
-            <a:ext cx="604746" cy="553998"/>
-          </a:xfrm>
-          <a:prstGeom prst="rect">
-            <a:avLst/>
-          </a:prstGeom>
-          <a:noFill/>
-        </p:spPr>
-        <p:txBody>
-          <a:bodyPr wrap="square" rtlCol="0">
-            <a:spAutoFit/>
-          </a:bodyPr>
-          <a:lstStyle>
-            <a:defPPr>
-              <a:defRPr lang="en-US"/>
-            </a:defPPr>
-            <a:lvl1pPr algn="just">
-              <a:defRPr sz="3000" b="0">
-                <a:solidFill>
-                  <a:schemeClr val="tx2">
-                    <a:lumMod val="65000"/>
-                    <a:lumOff val="35000"/>
-                  </a:schemeClr>
-                </a:solidFill>
-                <a:latin typeface="Poppins" panose="00000500000000000000" pitchFamily="2" charset="0"/>
-                <a:ea typeface="Roboto" panose="02000000000000000000" pitchFamily="2" charset="0"/>
-                <a:cs typeface="Poppins" panose="00000500000000000000" pitchFamily="2" charset="0"/>
-              </a:defRPr>
-            </a:lvl1pPr>
-          </a:lstStyle>
-          <a:p>
-            <a:r>
-              <a:rPr lang="pt-BR" b="1"/>
-              <a:t>+</a:t>
-            </a:r>
-            <a:endParaRPr lang="pt-BR"/>
           </a:p>
         </p:txBody>
       </p:sp>

</xml_diff>

<commit_message>
Código inicial do servidor Flask que gera slides PPTX
</commit_message>
<xml_diff>
--- a/template.pptx
+++ b/template.pptx
@@ -1894,7 +1894,7 @@
         </p:nvSpPr>
         <p:spPr>
           <a:xfrm>
-            <a:off x="1" y="895483"/>
+            <a:off x="1" y="925963"/>
             <a:ext cx="7581232" cy="553998"/>
           </a:xfrm>
           <a:prstGeom prst="rect">
@@ -1927,7 +1927,7 @@
           <a:p>
             <a:r>
               <a:rPr lang="pt-BR" b="1" dirty="0"/>
-              <a:t>titulo</a:t>
+              <a:t>{{titulo}}</a:t>
             </a:r>
             <a:endParaRPr lang="pt-BR" dirty="0"/>
           </a:p>
@@ -1974,7 +1974,7 @@
                 <a:ea typeface="Roboto" panose="02000000000000000000" pitchFamily="2" charset="0"/>
                 <a:cs typeface="Poppins" panose="00000500000000000000" pitchFamily="2" charset="0"/>
               </a:rPr>
-              <a:t>data</a:t>
+              <a:t>{{data}}</a:t>
             </a:r>
           </a:p>
         </p:txBody>
@@ -2019,7 +2019,7 @@
                 <a:ea typeface="Roboto" panose="02000000000000000000" pitchFamily="2" charset="0"/>
                 <a:cs typeface="Poppins" panose="00000500000000000000" pitchFamily="2" charset="0"/>
               </a:rPr>
-              <a:t>link</a:t>
+              <a:t>{{link}}</a:t>
             </a:r>
             <a:endParaRPr lang="en-US" sz="1600" dirty="0">
               <a:solidFill>
@@ -2598,7 +2598,7 @@
                 <a:ea typeface="Roboto" panose="02000000000000000000" pitchFamily="2" charset="0"/>
                 <a:cs typeface="Poppins" panose="00000500000000000000" pitchFamily="2" charset="0"/>
               </a:rPr>
-              <a:t>resumo</a:t>
+              <a:t>{{resumo}}</a:t>
             </a:r>
           </a:p>
           <a:p>
@@ -3783,7 +3783,21 @@
       </a:bgFillStyleLst>
     </a:fmtScheme>
   </a:themeElements>
-  <a:objectDefaults/>
+  <a:objectDefaults>
+    <a:txDef>
+      <a:spPr>
+        <a:noFill/>
+      </a:spPr>
+      <a:bodyPr wrap="square" rtlCol="0">
+        <a:spAutoFit/>
+      </a:bodyPr>
+      <a:lstStyle>
+        <a:defPPr algn="l">
+          <a:defRPr b="1" dirty="0" smtClean="0"/>
+        </a:defPPr>
+      </a:lstStyle>
+    </a:txDef>
+  </a:objectDefaults>
   <a:extraClrSchemeLst/>
   <a:extLst>
     <a:ext uri="{05A4C25C-085E-4340-85A3-A5531E510DB2}">

</xml_diff>

<commit_message>
Adiciona template de slides para preenchimento automático
</commit_message>
<xml_diff>
--- a/template.pptx
+++ b/template.pptx
@@ -3342,8 +3342,8 @@
         </p:nvSpPr>
         <p:spPr bwMode="auto">
           <a:xfrm>
-            <a:off x="178944" y="768122"/>
-            <a:ext cx="3406877" cy="707886"/>
+            <a:off x="178944" y="922010"/>
+            <a:ext cx="3406877" cy="400110"/>
           </a:xfrm>
           <a:prstGeom prst="rect">
             <a:avLst/>
@@ -3577,18 +3577,7 @@
                 </a:solidFill>
                 <a:latin typeface="Arial Unicode MS"/>
               </a:rPr>
-              <a:t>{{titulo}}{{resumo}} {{data}}{{link}}</a:t>
-            </a:r>
-            <a:r>
-              <a:rPr lang="pt-BR" altLang="pt-BR" sz="2000" dirty="0">
-                <a:solidFill>
-                  <a:schemeClr val="tx1">
-                    <a:lumMod val="65000"/>
-                    <a:lumOff val="35000"/>
-                  </a:schemeClr>
-                </a:solidFill>
-              </a:rPr>
-              <a:t> </a:t>
+              <a:t>{{titulo}}</a:t>
             </a:r>
             <a:endParaRPr lang="pt-BR" altLang="pt-BR" sz="2000" dirty="0">
               <a:solidFill>

</xml_diff>